<commit_message>
bug fix in line width for pptx
</commit_message>
<xml_diff>
--- a/examples/AlexNet.pptx
+++ b/examples/AlexNet.pptx
@@ -3264,7 +3264,7 @@
           <a:prstGeom prst="line">
             <a:avLst/>
           </a:prstGeom>
-          <a:ln w="1">
+          <a:ln w="12700">
             <a:solidFill>
               <a:srgbClr val="000000"/>
             </a:solidFill>
@@ -3299,7 +3299,7 @@
           <a:prstGeom prst="line">
             <a:avLst/>
           </a:prstGeom>
-          <a:ln w="1">
+          <a:ln w="12700">
             <a:solidFill>
               <a:srgbClr val="000000"/>
             </a:solidFill>
@@ -3335,7 +3335,7 @@
           <a:prstGeom prst="line">
             <a:avLst/>
           </a:prstGeom>
-          <a:ln w="1">
+          <a:ln w="12700">
             <a:solidFill>
               <a:srgbClr val="000000"/>
             </a:solidFill>
@@ -3370,7 +3370,7 @@
           <a:prstGeom prst="line">
             <a:avLst/>
           </a:prstGeom>
-          <a:ln w="1">
+          <a:ln w="12700">
             <a:solidFill>
               <a:srgbClr val="000000"/>
             </a:solidFill>
@@ -3405,7 +3405,7 @@
           <a:prstGeom prst="line">
             <a:avLst/>
           </a:prstGeom>
-          <a:ln w="1">
+          <a:ln w="12700">
             <a:solidFill>
               <a:srgbClr val="000000"/>
             </a:solidFill>
@@ -3440,7 +3440,7 @@
           <a:prstGeom prst="line">
             <a:avLst/>
           </a:prstGeom>
-          <a:ln w="1">
+          <a:ln w="12700">
             <a:solidFill>
               <a:srgbClr val="000000"/>
             </a:solidFill>
@@ -3475,7 +3475,7 @@
           <a:prstGeom prst="line">
             <a:avLst/>
           </a:prstGeom>
-          <a:ln w="1">
+          <a:ln w="12700">
             <a:solidFill>
               <a:srgbClr val="000000"/>
             </a:solidFill>
@@ -3511,7 +3511,7 @@
           <a:prstGeom prst="line">
             <a:avLst/>
           </a:prstGeom>
-          <a:ln w="1">
+          <a:ln w="12700">
             <a:solidFill>
               <a:srgbClr val="000000"/>
             </a:solidFill>
@@ -3546,7 +3546,7 @@
           <a:prstGeom prst="line">
             <a:avLst/>
           </a:prstGeom>
-          <a:ln w="1">
+          <a:ln w="12700">
             <a:solidFill>
               <a:srgbClr val="000000"/>
             </a:solidFill>
@@ -3582,7 +3582,7 @@
           <a:prstGeom prst="line">
             <a:avLst/>
           </a:prstGeom>
-          <a:ln w="1">
+          <a:ln w="12700">
             <a:solidFill>
               <a:srgbClr val="000000"/>
             </a:solidFill>
@@ -3617,7 +3617,7 @@
           <a:prstGeom prst="line">
             <a:avLst/>
           </a:prstGeom>
-          <a:ln w="1">
+          <a:ln w="12700">
             <a:solidFill>
               <a:srgbClr val="000000"/>
             </a:solidFill>
@@ -3652,7 +3652,7 @@
           <a:prstGeom prst="line">
             <a:avLst/>
           </a:prstGeom>
-          <a:ln w="1">
+          <a:ln w="12700">
             <a:solidFill>
               <a:srgbClr val="000000"/>
             </a:solidFill>
@@ -3720,7 +3720,7 @@
           <a:prstGeom prst="line">
             <a:avLst/>
           </a:prstGeom>
-          <a:ln w="1">
+          <a:ln w="12700">
             <a:solidFill>
               <a:srgbClr val="000000"/>
             </a:solidFill>
@@ -3755,7 +3755,7 @@
           <a:prstGeom prst="line">
             <a:avLst/>
           </a:prstGeom>
-          <a:ln w="1">
+          <a:ln w="12700">
             <a:solidFill>
               <a:srgbClr val="000000"/>
             </a:solidFill>
@@ -3791,7 +3791,7 @@
           <a:prstGeom prst="line">
             <a:avLst/>
           </a:prstGeom>
-          <a:ln w="1">
+          <a:ln w="12700">
             <a:solidFill>
               <a:srgbClr val="000000"/>
             </a:solidFill>
@@ -3826,7 +3826,7 @@
           <a:prstGeom prst="line">
             <a:avLst/>
           </a:prstGeom>
-          <a:ln w="1">
+          <a:ln w="12700">
             <a:solidFill>
               <a:srgbClr val="000000"/>
             </a:solidFill>
@@ -3861,7 +3861,7 @@
           <a:prstGeom prst="line">
             <a:avLst/>
           </a:prstGeom>
-          <a:ln w="1">
+          <a:ln w="12700">
             <a:solidFill>
               <a:srgbClr val="000000"/>
             </a:solidFill>
@@ -3896,7 +3896,7 @@
           <a:prstGeom prst="line">
             <a:avLst/>
           </a:prstGeom>
-          <a:ln w="1">
+          <a:ln w="12700">
             <a:solidFill>
               <a:srgbClr val="000000"/>
             </a:solidFill>
@@ -3931,7 +3931,7 @@
           <a:prstGeom prst="line">
             <a:avLst/>
           </a:prstGeom>
-          <a:ln w="1">
+          <a:ln w="12700">
             <a:solidFill>
               <a:srgbClr val="000000"/>
             </a:solidFill>
@@ -3967,7 +3967,7 @@
           <a:prstGeom prst="line">
             <a:avLst/>
           </a:prstGeom>
-          <a:ln w="1">
+          <a:ln w="12700">
             <a:solidFill>
               <a:srgbClr val="000000"/>
             </a:solidFill>
@@ -4002,7 +4002,7 @@
           <a:prstGeom prst="line">
             <a:avLst/>
           </a:prstGeom>
-          <a:ln w="1">
+          <a:ln w="12700">
             <a:solidFill>
               <a:srgbClr val="000000"/>
             </a:solidFill>
@@ -4038,7 +4038,7 @@
           <a:prstGeom prst="line">
             <a:avLst/>
           </a:prstGeom>
-          <a:ln w="1">
+          <a:ln w="12700">
             <a:solidFill>
               <a:srgbClr val="000000"/>
             </a:solidFill>
@@ -4073,7 +4073,7 @@
           <a:prstGeom prst="line">
             <a:avLst/>
           </a:prstGeom>
-          <a:ln w="1">
+          <a:ln w="12700">
             <a:solidFill>
               <a:srgbClr val="000000"/>
             </a:solidFill>
@@ -4108,7 +4108,7 @@
           <a:prstGeom prst="line">
             <a:avLst/>
           </a:prstGeom>
-          <a:ln w="1">
+          <a:ln w="12700">
             <a:solidFill>
               <a:srgbClr val="000000"/>
             </a:solidFill>
@@ -4176,7 +4176,7 @@
           <a:prstGeom prst="line">
             <a:avLst/>
           </a:prstGeom>
-          <a:ln w="1">
+          <a:ln w="12700">
             <a:solidFill>
               <a:srgbClr val="000000"/>
             </a:solidFill>
@@ -4211,7 +4211,7 @@
           <a:prstGeom prst="line">
             <a:avLst/>
           </a:prstGeom>
-          <a:ln w="1">
+          <a:ln w="12700">
             <a:solidFill>
               <a:srgbClr val="000000"/>
             </a:solidFill>
@@ -4247,7 +4247,7 @@
           <a:prstGeom prst="line">
             <a:avLst/>
           </a:prstGeom>
-          <a:ln w="1">
+          <a:ln w="12700">
             <a:solidFill>
               <a:srgbClr val="000000"/>
             </a:solidFill>
@@ -4282,7 +4282,7 @@
           <a:prstGeom prst="line">
             <a:avLst/>
           </a:prstGeom>
-          <a:ln w="1">
+          <a:ln w="12700">
             <a:solidFill>
               <a:srgbClr val="000000"/>
             </a:solidFill>
@@ -4317,7 +4317,7 @@
           <a:prstGeom prst="line">
             <a:avLst/>
           </a:prstGeom>
-          <a:ln w="1">
+          <a:ln w="12700">
             <a:solidFill>
               <a:srgbClr val="000000"/>
             </a:solidFill>
@@ -4352,7 +4352,7 @@
           <a:prstGeom prst="line">
             <a:avLst/>
           </a:prstGeom>
-          <a:ln w="1">
+          <a:ln w="12700">
             <a:solidFill>
               <a:srgbClr val="000000"/>
             </a:solidFill>
@@ -4387,7 +4387,7 @@
           <a:prstGeom prst="line">
             <a:avLst/>
           </a:prstGeom>
-          <a:ln w="1">
+          <a:ln w="12700">
             <a:solidFill>
               <a:srgbClr val="000000"/>
             </a:solidFill>
@@ -4423,7 +4423,7 @@
           <a:prstGeom prst="line">
             <a:avLst/>
           </a:prstGeom>
-          <a:ln w="1">
+          <a:ln w="12700">
             <a:solidFill>
               <a:srgbClr val="000000"/>
             </a:solidFill>
@@ -4458,7 +4458,7 @@
           <a:prstGeom prst="line">
             <a:avLst/>
           </a:prstGeom>
-          <a:ln w="1">
+          <a:ln w="12700">
             <a:solidFill>
               <a:srgbClr val="000000"/>
             </a:solidFill>
@@ -4494,7 +4494,7 @@
           <a:prstGeom prst="line">
             <a:avLst/>
           </a:prstGeom>
-          <a:ln w="1">
+          <a:ln w="12700">
             <a:solidFill>
               <a:srgbClr val="000000"/>
             </a:solidFill>
@@ -4529,7 +4529,7 @@
           <a:prstGeom prst="line">
             <a:avLst/>
           </a:prstGeom>
-          <a:ln w="1">
+          <a:ln w="12700">
             <a:solidFill>
               <a:srgbClr val="000000"/>
             </a:solidFill>
@@ -4564,7 +4564,7 @@
           <a:prstGeom prst="line">
             <a:avLst/>
           </a:prstGeom>
-          <a:ln w="1">
+          <a:ln w="12700">
             <a:solidFill>
               <a:srgbClr val="000000"/>
             </a:solidFill>
@@ -4632,7 +4632,7 @@
           <a:prstGeom prst="line">
             <a:avLst/>
           </a:prstGeom>
-          <a:ln w="1">
+          <a:ln w="12700">
             <a:solidFill>
               <a:srgbClr val="000000"/>
             </a:solidFill>
@@ -4667,7 +4667,7 @@
           <a:prstGeom prst="line">
             <a:avLst/>
           </a:prstGeom>
-          <a:ln w="1">
+          <a:ln w="12700">
             <a:solidFill>
               <a:srgbClr val="000000"/>
             </a:solidFill>
@@ -4703,7 +4703,7 @@
           <a:prstGeom prst="line">
             <a:avLst/>
           </a:prstGeom>
-          <a:ln w="1">
+          <a:ln w="12700">
             <a:solidFill>
               <a:srgbClr val="000000"/>
             </a:solidFill>
@@ -4738,7 +4738,7 @@
           <a:prstGeom prst="line">
             <a:avLst/>
           </a:prstGeom>
-          <a:ln w="1">
+          <a:ln w="12700">
             <a:solidFill>
               <a:srgbClr val="000000"/>
             </a:solidFill>
@@ -4773,7 +4773,7 @@
           <a:prstGeom prst="line">
             <a:avLst/>
           </a:prstGeom>
-          <a:ln w="1">
+          <a:ln w="12700">
             <a:solidFill>
               <a:srgbClr val="000000"/>
             </a:solidFill>
@@ -4808,7 +4808,7 @@
           <a:prstGeom prst="line">
             <a:avLst/>
           </a:prstGeom>
-          <a:ln w="1">
+          <a:ln w="12700">
             <a:solidFill>
               <a:srgbClr val="000000"/>
             </a:solidFill>
@@ -4843,7 +4843,7 @@
           <a:prstGeom prst="line">
             <a:avLst/>
           </a:prstGeom>
-          <a:ln w="1">
+          <a:ln w="12700">
             <a:solidFill>
               <a:srgbClr val="000000"/>
             </a:solidFill>
@@ -4879,7 +4879,7 @@
           <a:prstGeom prst="line">
             <a:avLst/>
           </a:prstGeom>
-          <a:ln w="1">
+          <a:ln w="12700">
             <a:solidFill>
               <a:srgbClr val="000000"/>
             </a:solidFill>
@@ -4914,7 +4914,7 @@
           <a:prstGeom prst="line">
             <a:avLst/>
           </a:prstGeom>
-          <a:ln w="1">
+          <a:ln w="12700">
             <a:solidFill>
               <a:srgbClr val="000000"/>
             </a:solidFill>
@@ -4950,7 +4950,7 @@
           <a:prstGeom prst="line">
             <a:avLst/>
           </a:prstGeom>
-          <a:ln w="1">
+          <a:ln w="12700">
             <a:solidFill>
               <a:srgbClr val="000000"/>
             </a:solidFill>
@@ -4985,7 +4985,7 @@
           <a:prstGeom prst="line">
             <a:avLst/>
           </a:prstGeom>
-          <a:ln w="1">
+          <a:ln w="12700">
             <a:solidFill>
               <a:srgbClr val="000000"/>
             </a:solidFill>
@@ -5020,7 +5020,7 @@
           <a:prstGeom prst="line">
             <a:avLst/>
           </a:prstGeom>
-          <a:ln w="1">
+          <a:ln w="12700">
             <a:solidFill>
               <a:srgbClr val="000000"/>
             </a:solidFill>
@@ -5088,7 +5088,7 @@
           <a:prstGeom prst="line">
             <a:avLst/>
           </a:prstGeom>
-          <a:ln w="1">
+          <a:ln w="12700">
             <a:solidFill>
               <a:srgbClr val="000000"/>
             </a:solidFill>
@@ -5123,7 +5123,7 @@
           <a:prstGeom prst="line">
             <a:avLst/>
           </a:prstGeom>
-          <a:ln w="1">
+          <a:ln w="12700">
             <a:solidFill>
               <a:srgbClr val="000000"/>
             </a:solidFill>
@@ -5159,7 +5159,7 @@
           <a:prstGeom prst="line">
             <a:avLst/>
           </a:prstGeom>
-          <a:ln w="1">
+          <a:ln w="12700">
             <a:solidFill>
               <a:srgbClr val="000000"/>
             </a:solidFill>
@@ -5194,7 +5194,7 @@
           <a:prstGeom prst="line">
             <a:avLst/>
           </a:prstGeom>
-          <a:ln w="1">
+          <a:ln w="12700">
             <a:solidFill>
               <a:srgbClr val="000000"/>
             </a:solidFill>
@@ -5229,7 +5229,7 @@
           <a:prstGeom prst="line">
             <a:avLst/>
           </a:prstGeom>
-          <a:ln w="1">
+          <a:ln w="12700">
             <a:solidFill>
               <a:srgbClr val="000000"/>
             </a:solidFill>
@@ -5264,7 +5264,7 @@
           <a:prstGeom prst="line">
             <a:avLst/>
           </a:prstGeom>
-          <a:ln w="1">
+          <a:ln w="12700">
             <a:solidFill>
               <a:srgbClr val="000000"/>
             </a:solidFill>
@@ -5299,7 +5299,7 @@
           <a:prstGeom prst="line">
             <a:avLst/>
           </a:prstGeom>
-          <a:ln w="1">
+          <a:ln w="12700">
             <a:solidFill>
               <a:srgbClr val="000000"/>
             </a:solidFill>
@@ -5335,7 +5335,7 @@
           <a:prstGeom prst="line">
             <a:avLst/>
           </a:prstGeom>
-          <a:ln w="1">
+          <a:ln w="12700">
             <a:solidFill>
               <a:srgbClr val="000000"/>
             </a:solidFill>
@@ -5370,7 +5370,7 @@
           <a:prstGeom prst="line">
             <a:avLst/>
           </a:prstGeom>
-          <a:ln w="1">
+          <a:ln w="12700">
             <a:solidFill>
               <a:srgbClr val="000000"/>
             </a:solidFill>
@@ -5406,7 +5406,7 @@
           <a:prstGeom prst="line">
             <a:avLst/>
           </a:prstGeom>
-          <a:ln w="1">
+          <a:ln w="12700">
             <a:solidFill>
               <a:srgbClr val="000000"/>
             </a:solidFill>
@@ -5441,7 +5441,7 @@
           <a:prstGeom prst="line">
             <a:avLst/>
           </a:prstGeom>
-          <a:ln w="1">
+          <a:ln w="12700">
             <a:solidFill>
               <a:srgbClr val="000000"/>
             </a:solidFill>
@@ -5476,7 +5476,7 @@
           <a:prstGeom prst="line">
             <a:avLst/>
           </a:prstGeom>
-          <a:ln w="1">
+          <a:ln w="12700">
             <a:solidFill>
               <a:srgbClr val="000000"/>
             </a:solidFill>
@@ -5544,7 +5544,7 @@
           <a:prstGeom prst="line">
             <a:avLst/>
           </a:prstGeom>
-          <a:ln w="1">
+          <a:ln w="12700">
             <a:solidFill>
               <a:srgbClr val="000000"/>
             </a:solidFill>
@@ -5579,7 +5579,7 @@
           <a:prstGeom prst="line">
             <a:avLst/>
           </a:prstGeom>
-          <a:ln w="1">
+          <a:ln w="12700">
             <a:solidFill>
               <a:srgbClr val="000000"/>
             </a:solidFill>
@@ -5615,7 +5615,7 @@
           <a:prstGeom prst="line">
             <a:avLst/>
           </a:prstGeom>
-          <a:ln w="1">
+          <a:ln w="12700">
             <a:solidFill>
               <a:srgbClr val="000000"/>
             </a:solidFill>
@@ -5650,7 +5650,7 @@
           <a:prstGeom prst="line">
             <a:avLst/>
           </a:prstGeom>
-          <a:ln w="1">
+          <a:ln w="12700">
             <a:solidFill>
               <a:srgbClr val="000000"/>
             </a:solidFill>
@@ -5685,7 +5685,7 @@
           <a:prstGeom prst="line">
             <a:avLst/>
           </a:prstGeom>
-          <a:ln w="1">
+          <a:ln w="12700">
             <a:solidFill>
               <a:srgbClr val="000000"/>
             </a:solidFill>
@@ -5720,7 +5720,7 @@
           <a:prstGeom prst="line">
             <a:avLst/>
           </a:prstGeom>
-          <a:ln w="1">
+          <a:ln w="12700">
             <a:solidFill>
               <a:srgbClr val="000000"/>
             </a:solidFill>
@@ -5755,7 +5755,7 @@
           <a:prstGeom prst="line">
             <a:avLst/>
           </a:prstGeom>
-          <a:ln w="1">
+          <a:ln w="12700">
             <a:solidFill>
               <a:srgbClr val="000000"/>
             </a:solidFill>
@@ -5791,7 +5791,7 @@
           <a:prstGeom prst="line">
             <a:avLst/>
           </a:prstGeom>
-          <a:ln w="1">
+          <a:ln w="12700">
             <a:solidFill>
               <a:srgbClr val="000000"/>
             </a:solidFill>
@@ -5826,7 +5826,7 @@
           <a:prstGeom prst="line">
             <a:avLst/>
           </a:prstGeom>
-          <a:ln w="1">
+          <a:ln w="12700">
             <a:solidFill>
               <a:srgbClr val="000000"/>
             </a:solidFill>
@@ -5862,7 +5862,7 @@
           <a:prstGeom prst="line">
             <a:avLst/>
           </a:prstGeom>
-          <a:ln w="1">
+          <a:ln w="12700">
             <a:solidFill>
               <a:srgbClr val="000000"/>
             </a:solidFill>
@@ -5897,7 +5897,7 @@
           <a:prstGeom prst="line">
             <a:avLst/>
           </a:prstGeom>
-          <a:ln w="1">
+          <a:ln w="12700">
             <a:solidFill>
               <a:srgbClr val="000000"/>
             </a:solidFill>
@@ -5932,7 +5932,7 @@
           <a:prstGeom prst="line">
             <a:avLst/>
           </a:prstGeom>
-          <a:ln w="1">
+          <a:ln w="12700">
             <a:solidFill>
               <a:srgbClr val="000000"/>
             </a:solidFill>
@@ -6000,7 +6000,7 @@
           <a:prstGeom prst="line">
             <a:avLst/>
           </a:prstGeom>
-          <a:ln w="1">
+          <a:ln w="12700">
             <a:solidFill>
               <a:srgbClr val="000000"/>
             </a:solidFill>
@@ -6035,7 +6035,7 @@
           <a:prstGeom prst="line">
             <a:avLst/>
           </a:prstGeom>
-          <a:ln w="1">
+          <a:ln w="12700">
             <a:solidFill>
               <a:srgbClr val="000000"/>
             </a:solidFill>
@@ -6071,7 +6071,7 @@
           <a:prstGeom prst="line">
             <a:avLst/>
           </a:prstGeom>
-          <a:ln w="1">
+          <a:ln w="12700">
             <a:solidFill>
               <a:srgbClr val="000000"/>
             </a:solidFill>
@@ -6106,7 +6106,7 @@
           <a:prstGeom prst="line">
             <a:avLst/>
           </a:prstGeom>
-          <a:ln w="1">
+          <a:ln w="12700">
             <a:solidFill>
               <a:srgbClr val="000000"/>
             </a:solidFill>
@@ -6141,7 +6141,7 @@
           <a:prstGeom prst="line">
             <a:avLst/>
           </a:prstGeom>
-          <a:ln w="1">
+          <a:ln w="12700">
             <a:solidFill>
               <a:srgbClr val="000000"/>
             </a:solidFill>
@@ -6176,7 +6176,7 @@
           <a:prstGeom prst="line">
             <a:avLst/>
           </a:prstGeom>
-          <a:ln w="1">
+          <a:ln w="12700">
             <a:solidFill>
               <a:srgbClr val="000000"/>
             </a:solidFill>
@@ -6211,7 +6211,7 @@
           <a:prstGeom prst="line">
             <a:avLst/>
           </a:prstGeom>
-          <a:ln w="1">
+          <a:ln w="12700">
             <a:solidFill>
               <a:srgbClr val="000000"/>
             </a:solidFill>
@@ -6247,7 +6247,7 @@
           <a:prstGeom prst="line">
             <a:avLst/>
           </a:prstGeom>
-          <a:ln w="1">
+          <a:ln w="12700">
             <a:solidFill>
               <a:srgbClr val="000000"/>
             </a:solidFill>
@@ -6282,7 +6282,7 @@
           <a:prstGeom prst="line">
             <a:avLst/>
           </a:prstGeom>
-          <a:ln w="1">
+          <a:ln w="12700">
             <a:solidFill>
               <a:srgbClr val="000000"/>
             </a:solidFill>
@@ -6318,7 +6318,7 @@
           <a:prstGeom prst="line">
             <a:avLst/>
           </a:prstGeom>
-          <a:ln w="1">
+          <a:ln w="12700">
             <a:solidFill>
               <a:srgbClr val="000000"/>
             </a:solidFill>
@@ -6353,7 +6353,7 @@
           <a:prstGeom prst="line">
             <a:avLst/>
           </a:prstGeom>
-          <a:ln w="1">
+          <a:ln w="12700">
             <a:solidFill>
               <a:srgbClr val="000000"/>
             </a:solidFill>
@@ -6388,7 +6388,7 @@
           <a:prstGeom prst="line">
             <a:avLst/>
           </a:prstGeom>
-          <a:ln w="1">
+          <a:ln w="12700">
             <a:solidFill>
               <a:srgbClr val="000000"/>
             </a:solidFill>
@@ -6456,7 +6456,7 @@
           <a:prstGeom prst="line">
             <a:avLst/>
           </a:prstGeom>
-          <a:ln w="1">
+          <a:ln w="12700">
             <a:solidFill>
               <a:srgbClr val="000000"/>
             </a:solidFill>
@@ -6491,7 +6491,7 @@
           <a:prstGeom prst="line">
             <a:avLst/>
           </a:prstGeom>
-          <a:ln w="1">
+          <a:ln w="12700">
             <a:solidFill>
               <a:srgbClr val="000000"/>
             </a:solidFill>
@@ -6527,7 +6527,7 @@
           <a:prstGeom prst="line">
             <a:avLst/>
           </a:prstGeom>
-          <a:ln w="1">
+          <a:ln w="12700">
             <a:solidFill>
               <a:srgbClr val="000000"/>
             </a:solidFill>
@@ -6562,7 +6562,7 @@
           <a:prstGeom prst="line">
             <a:avLst/>
           </a:prstGeom>
-          <a:ln w="1">
+          <a:ln w="12700">
             <a:solidFill>
               <a:srgbClr val="000000"/>
             </a:solidFill>
@@ -6597,7 +6597,7 @@
           <a:prstGeom prst="line">
             <a:avLst/>
           </a:prstGeom>
-          <a:ln w="1">
+          <a:ln w="12700">
             <a:solidFill>
               <a:srgbClr val="000000"/>
             </a:solidFill>
@@ -6632,7 +6632,7 @@
           <a:prstGeom prst="line">
             <a:avLst/>
           </a:prstGeom>
-          <a:ln w="1">
+          <a:ln w="12700">
             <a:solidFill>
               <a:srgbClr val="000000"/>
             </a:solidFill>
@@ -6667,7 +6667,7 @@
           <a:prstGeom prst="line">
             <a:avLst/>
           </a:prstGeom>
-          <a:ln w="1">
+          <a:ln w="12700">
             <a:solidFill>
               <a:srgbClr val="000000"/>
             </a:solidFill>
@@ -6703,7 +6703,7 @@
           <a:prstGeom prst="line">
             <a:avLst/>
           </a:prstGeom>
-          <a:ln w="1">
+          <a:ln w="12700">
             <a:solidFill>
               <a:srgbClr val="000000"/>
             </a:solidFill>
@@ -6738,7 +6738,7 @@
           <a:prstGeom prst="line">
             <a:avLst/>
           </a:prstGeom>
-          <a:ln w="1">
+          <a:ln w="12700">
             <a:solidFill>
               <a:srgbClr val="000000"/>
             </a:solidFill>
@@ -6774,7 +6774,7 @@
           <a:prstGeom prst="line">
             <a:avLst/>
           </a:prstGeom>
-          <a:ln w="1">
+          <a:ln w="12700">
             <a:solidFill>
               <a:srgbClr val="000000"/>
             </a:solidFill>
@@ -6809,7 +6809,7 @@
           <a:prstGeom prst="line">
             <a:avLst/>
           </a:prstGeom>
-          <a:ln w="1">
+          <a:ln w="12700">
             <a:solidFill>
               <a:srgbClr val="000000"/>
             </a:solidFill>
@@ -6844,7 +6844,7 @@
           <a:prstGeom prst="line">
             <a:avLst/>
           </a:prstGeom>
-          <a:ln w="1">
+          <a:ln w="12700">
             <a:solidFill>
               <a:srgbClr val="000000"/>
             </a:solidFill>
@@ -6912,7 +6912,7 @@
           <a:prstGeom prst="line">
             <a:avLst/>
           </a:prstGeom>
-          <a:ln w="1">
+          <a:ln w="12700">
             <a:solidFill>
               <a:srgbClr val="000000"/>
             </a:solidFill>
@@ -6947,7 +6947,7 @@
           <a:prstGeom prst="line">
             <a:avLst/>
           </a:prstGeom>
-          <a:ln w="1">
+          <a:ln w="12700">
             <a:solidFill>
               <a:srgbClr val="000000"/>
             </a:solidFill>
@@ -6983,7 +6983,7 @@
           <a:prstGeom prst="line">
             <a:avLst/>
           </a:prstGeom>
-          <a:ln w="1">
+          <a:ln w="12700">
             <a:solidFill>
               <a:srgbClr val="000000"/>
             </a:solidFill>
@@ -7018,7 +7018,7 @@
           <a:prstGeom prst="line">
             <a:avLst/>
           </a:prstGeom>
-          <a:ln w="1">
+          <a:ln w="12700">
             <a:solidFill>
               <a:srgbClr val="000000"/>
             </a:solidFill>
@@ -7053,7 +7053,7 @@
           <a:prstGeom prst="line">
             <a:avLst/>
           </a:prstGeom>
-          <a:ln w="1">
+          <a:ln w="12700">
             <a:solidFill>
               <a:srgbClr val="000000"/>
             </a:solidFill>
@@ -7088,7 +7088,7 @@
           <a:prstGeom prst="line">
             <a:avLst/>
           </a:prstGeom>
-          <a:ln w="1">
+          <a:ln w="12700">
             <a:solidFill>
               <a:srgbClr val="000000"/>
             </a:solidFill>
@@ -7123,7 +7123,7 @@
           <a:prstGeom prst="line">
             <a:avLst/>
           </a:prstGeom>
-          <a:ln w="1">
+          <a:ln w="12700">
             <a:solidFill>
               <a:srgbClr val="000000"/>
             </a:solidFill>
@@ -7159,7 +7159,7 @@
           <a:prstGeom prst="line">
             <a:avLst/>
           </a:prstGeom>
-          <a:ln w="1">
+          <a:ln w="12700">
             <a:solidFill>
               <a:srgbClr val="000000"/>
             </a:solidFill>
@@ -7194,7 +7194,7 @@
           <a:prstGeom prst="line">
             <a:avLst/>
           </a:prstGeom>
-          <a:ln w="1">
+          <a:ln w="12700">
             <a:solidFill>
               <a:srgbClr val="000000"/>
             </a:solidFill>
@@ -7230,7 +7230,7 @@
           <a:prstGeom prst="line">
             <a:avLst/>
           </a:prstGeom>
-          <a:ln w="1">
+          <a:ln w="12700">
             <a:solidFill>
               <a:srgbClr val="000000"/>
             </a:solidFill>
@@ -7265,7 +7265,7 @@
           <a:prstGeom prst="line">
             <a:avLst/>
           </a:prstGeom>
-          <a:ln w="1">
+          <a:ln w="12700">
             <a:solidFill>
               <a:srgbClr val="000000"/>
             </a:solidFill>
@@ -7300,7 +7300,7 @@
           <a:prstGeom prst="line">
             <a:avLst/>
           </a:prstGeom>
-          <a:ln w="1">
+          <a:ln w="12700">
             <a:solidFill>
               <a:srgbClr val="000000"/>
             </a:solidFill>
@@ -7368,7 +7368,7 @@
           <a:prstGeom prst="line">
             <a:avLst/>
           </a:prstGeom>
-          <a:ln w="1">
+          <a:ln w="12700">
             <a:solidFill>
               <a:srgbClr val="000000"/>
             </a:solidFill>
@@ -7403,7 +7403,7 @@
           <a:prstGeom prst="line">
             <a:avLst/>
           </a:prstGeom>
-          <a:ln w="1">
+          <a:ln w="12700">
             <a:solidFill>
               <a:srgbClr val="000000"/>
             </a:solidFill>
@@ -7438,7 +7438,7 @@
           <a:prstGeom prst="line">
             <a:avLst/>
           </a:prstGeom>
-          <a:ln w="1">
+          <a:ln w="12700">
             <a:solidFill>
               <a:srgbClr val="000000"/>
             </a:solidFill>
@@ -7473,7 +7473,7 @@
           <a:prstGeom prst="line">
             <a:avLst/>
           </a:prstGeom>
-          <a:ln w="1">
+          <a:ln w="12700">
             <a:solidFill>
               <a:srgbClr val="000000"/>
             </a:solidFill>
@@ -7541,7 +7541,7 @@
           <a:prstGeom prst="line">
             <a:avLst/>
           </a:prstGeom>
-          <a:ln w="1">
+          <a:ln w="12700">
             <a:solidFill>
               <a:srgbClr val="000000"/>
             </a:solidFill>
@@ -7576,7 +7576,7 @@
           <a:prstGeom prst="line">
             <a:avLst/>
           </a:prstGeom>
-          <a:ln w="1">
+          <a:ln w="12700">
             <a:solidFill>
               <a:srgbClr val="000000"/>
             </a:solidFill>
@@ -7611,7 +7611,7 @@
           <a:prstGeom prst="line">
             <a:avLst/>
           </a:prstGeom>
-          <a:ln w="1">
+          <a:ln w="12700">
             <a:solidFill>
               <a:srgbClr val="000000"/>
             </a:solidFill>
@@ -7646,7 +7646,7 @@
           <a:prstGeom prst="line">
             <a:avLst/>
           </a:prstGeom>
-          <a:ln w="1">
+          <a:ln w="12700">
             <a:solidFill>
               <a:srgbClr val="000000"/>
             </a:solidFill>
@@ -7714,7 +7714,7 @@
           <a:prstGeom prst="line">
             <a:avLst/>
           </a:prstGeom>
-          <a:ln w="1">
+          <a:ln w="12700">
             <a:solidFill>
               <a:srgbClr val="000000"/>
             </a:solidFill>
@@ -7749,7 +7749,7 @@
           <a:prstGeom prst="line">
             <a:avLst/>
           </a:prstGeom>
-          <a:ln w="1">
+          <a:ln w="12700">
             <a:solidFill>
               <a:srgbClr val="000000"/>
             </a:solidFill>
@@ -7784,7 +7784,7 @@
           <a:prstGeom prst="line">
             <a:avLst/>
           </a:prstGeom>
-          <a:ln w="1">
+          <a:ln w="12700">
             <a:solidFill>
               <a:srgbClr val="000000"/>
             </a:solidFill>
@@ -7819,7 +7819,7 @@
           <a:prstGeom prst="line">
             <a:avLst/>
           </a:prstGeom>
-          <a:ln w="1">
+          <a:ln w="12700">
             <a:solidFill>
               <a:srgbClr val="000000"/>
             </a:solidFill>
@@ -7887,7 +7887,7 @@
           <a:prstGeom prst="line">
             <a:avLst/>
           </a:prstGeom>
-          <a:ln w="1">
+          <a:ln w="12700">
             <a:solidFill>
               <a:srgbClr val="000000"/>
             </a:solidFill>
@@ -7922,7 +7922,7 @@
           <a:prstGeom prst="line">
             <a:avLst/>
           </a:prstGeom>
-          <a:ln w="1">
+          <a:ln w="12700">
             <a:solidFill>
               <a:srgbClr val="000000"/>
             </a:solidFill>
@@ -7957,7 +7957,7 @@
           <a:prstGeom prst="line">
             <a:avLst/>
           </a:prstGeom>
-          <a:ln w="1">
+          <a:ln w="12700">
             <a:solidFill>
               <a:srgbClr val="000000"/>
             </a:solidFill>
@@ -7992,7 +7992,7 @@
           <a:prstGeom prst="line">
             <a:avLst/>
           </a:prstGeom>
-          <a:ln w="1">
+          <a:ln w="12700">
             <a:solidFill>
               <a:srgbClr val="000000"/>
             </a:solidFill>
@@ -8060,7 +8060,7 @@
           <a:prstGeom prst="line">
             <a:avLst/>
           </a:prstGeom>
-          <a:ln w="1">
+          <a:ln w="12700">
             <a:solidFill>
               <a:srgbClr val="0000FF"/>
             </a:solidFill>
@@ -8095,7 +8095,7 @@
           <a:prstGeom prst="line">
             <a:avLst/>
           </a:prstGeom>
-          <a:ln w="1">
+          <a:ln w="12700">
             <a:solidFill>
               <a:srgbClr val="0000FF"/>
             </a:solidFill>
@@ -8131,7 +8131,7 @@
           <a:prstGeom prst="line">
             <a:avLst/>
           </a:prstGeom>
-          <a:ln w="1">
+          <a:ln w="12700">
             <a:solidFill>
               <a:srgbClr val="0000FF"/>
             </a:solidFill>
@@ -8166,7 +8166,7 @@
           <a:prstGeom prst="line">
             <a:avLst/>
           </a:prstGeom>
-          <a:ln w="1">
+          <a:ln w="12700">
             <a:solidFill>
               <a:srgbClr val="0000FF"/>
             </a:solidFill>
@@ -8201,7 +8201,7 @@
           <a:prstGeom prst="line">
             <a:avLst/>
           </a:prstGeom>
-          <a:ln w="1">
+          <a:ln w="12700">
             <a:solidFill>
               <a:srgbClr val="0000FF"/>
             </a:solidFill>
@@ -8236,7 +8236,7 @@
           <a:prstGeom prst="line">
             <a:avLst/>
           </a:prstGeom>
-          <a:ln w="1">
+          <a:ln w="12700">
             <a:solidFill>
               <a:srgbClr val="0000FF"/>
             </a:solidFill>
@@ -8271,7 +8271,7 @@
           <a:prstGeom prst="line">
             <a:avLst/>
           </a:prstGeom>
-          <a:ln w="1">
+          <a:ln w="12700">
             <a:solidFill>
               <a:srgbClr val="0000FF"/>
             </a:solidFill>
@@ -8307,7 +8307,7 @@
           <a:prstGeom prst="line">
             <a:avLst/>
           </a:prstGeom>
-          <a:ln w="1">
+          <a:ln w="12700">
             <a:solidFill>
               <a:srgbClr val="0000FF"/>
             </a:solidFill>
@@ -8342,7 +8342,7 @@
           <a:prstGeom prst="line">
             <a:avLst/>
           </a:prstGeom>
-          <a:ln w="1">
+          <a:ln w="12700">
             <a:solidFill>
               <a:srgbClr val="0000FF"/>
             </a:solidFill>
@@ -8378,7 +8378,7 @@
           <a:prstGeom prst="line">
             <a:avLst/>
           </a:prstGeom>
-          <a:ln w="1">
+          <a:ln w="12700">
             <a:solidFill>
               <a:srgbClr val="0000FF"/>
             </a:solidFill>
@@ -8413,7 +8413,7 @@
           <a:prstGeom prst="line">
             <a:avLst/>
           </a:prstGeom>
-          <a:ln w="1">
+          <a:ln w="12700">
             <a:solidFill>
               <a:srgbClr val="0000FF"/>
             </a:solidFill>
@@ -8448,7 +8448,7 @@
           <a:prstGeom prst="line">
             <a:avLst/>
           </a:prstGeom>
-          <a:ln w="1">
+          <a:ln w="12700">
             <a:solidFill>
               <a:srgbClr val="0000FF"/>
             </a:solidFill>
@@ -8483,7 +8483,7 @@
           <a:prstGeom prst="line">
             <a:avLst/>
           </a:prstGeom>
-          <a:ln w="1">
+          <a:ln w="12700">
             <a:solidFill>
               <a:srgbClr val="0000FF"/>
             </a:solidFill>
@@ -8518,7 +8518,7 @@
           <a:prstGeom prst="line">
             <a:avLst/>
           </a:prstGeom>
-          <a:ln w="1">
+          <a:ln w="12700">
             <a:solidFill>
               <a:srgbClr val="0000FF"/>
             </a:solidFill>
@@ -8619,7 +8619,7 @@
           <a:prstGeom prst="line">
             <a:avLst/>
           </a:prstGeom>
-          <a:ln w="1">
+          <a:ln w="12700">
             <a:solidFill>
               <a:srgbClr val="0000FF"/>
             </a:solidFill>
@@ -8654,7 +8654,7 @@
           <a:prstGeom prst="line">
             <a:avLst/>
           </a:prstGeom>
-          <a:ln w="1">
+          <a:ln w="12700">
             <a:solidFill>
               <a:srgbClr val="0000FF"/>
             </a:solidFill>
@@ -8690,7 +8690,7 @@
           <a:prstGeom prst="line">
             <a:avLst/>
           </a:prstGeom>
-          <a:ln w="1">
+          <a:ln w="12700">
             <a:solidFill>
               <a:srgbClr val="0000FF"/>
             </a:solidFill>
@@ -8725,7 +8725,7 @@
           <a:prstGeom prst="line">
             <a:avLst/>
           </a:prstGeom>
-          <a:ln w="1">
+          <a:ln w="12700">
             <a:solidFill>
               <a:srgbClr val="0000FF"/>
             </a:solidFill>
@@ -8760,7 +8760,7 @@
           <a:prstGeom prst="line">
             <a:avLst/>
           </a:prstGeom>
-          <a:ln w="1">
+          <a:ln w="12700">
             <a:solidFill>
               <a:srgbClr val="0000FF"/>
             </a:solidFill>
@@ -8795,7 +8795,7 @@
           <a:prstGeom prst="line">
             <a:avLst/>
           </a:prstGeom>
-          <a:ln w="1">
+          <a:ln w="12700">
             <a:solidFill>
               <a:srgbClr val="0000FF"/>
             </a:solidFill>
@@ -8830,7 +8830,7 @@
           <a:prstGeom prst="line">
             <a:avLst/>
           </a:prstGeom>
-          <a:ln w="1">
+          <a:ln w="12700">
             <a:solidFill>
               <a:srgbClr val="0000FF"/>
             </a:solidFill>
@@ -8866,7 +8866,7 @@
           <a:prstGeom prst="line">
             <a:avLst/>
           </a:prstGeom>
-          <a:ln w="1">
+          <a:ln w="12700">
             <a:solidFill>
               <a:srgbClr val="0000FF"/>
             </a:solidFill>
@@ -8901,7 +8901,7 @@
           <a:prstGeom prst="line">
             <a:avLst/>
           </a:prstGeom>
-          <a:ln w="1">
+          <a:ln w="12700">
             <a:solidFill>
               <a:srgbClr val="0000FF"/>
             </a:solidFill>
@@ -8937,7 +8937,7 @@
           <a:prstGeom prst="line">
             <a:avLst/>
           </a:prstGeom>
-          <a:ln w="1">
+          <a:ln w="12700">
             <a:solidFill>
               <a:srgbClr val="0000FF"/>
             </a:solidFill>
@@ -8972,7 +8972,7 @@
           <a:prstGeom prst="line">
             <a:avLst/>
           </a:prstGeom>
-          <a:ln w="1">
+          <a:ln w="12700">
             <a:solidFill>
               <a:srgbClr val="0000FF"/>
             </a:solidFill>
@@ -9007,7 +9007,7 @@
           <a:prstGeom prst="line">
             <a:avLst/>
           </a:prstGeom>
-          <a:ln w="1">
+          <a:ln w="12700">
             <a:solidFill>
               <a:srgbClr val="0000FF"/>
             </a:solidFill>
@@ -9042,7 +9042,7 @@
           <a:prstGeom prst="line">
             <a:avLst/>
           </a:prstGeom>
-          <a:ln w="1">
+          <a:ln w="12700">
             <a:solidFill>
               <a:srgbClr val="0000FF"/>
             </a:solidFill>
@@ -9077,7 +9077,7 @@
           <a:prstGeom prst="line">
             <a:avLst/>
           </a:prstGeom>
-          <a:ln w="1">
+          <a:ln w="12700">
             <a:solidFill>
               <a:srgbClr val="0000FF"/>
             </a:solidFill>
@@ -9178,7 +9178,7 @@
           <a:prstGeom prst="line">
             <a:avLst/>
           </a:prstGeom>
-          <a:ln w="1">
+          <a:ln w="12700">
             <a:solidFill>
               <a:srgbClr val="0000FF"/>
             </a:solidFill>
@@ -9213,7 +9213,7 @@
           <a:prstGeom prst="line">
             <a:avLst/>
           </a:prstGeom>
-          <a:ln w="1">
+          <a:ln w="12700">
             <a:solidFill>
               <a:srgbClr val="0000FF"/>
             </a:solidFill>
@@ -9249,7 +9249,7 @@
           <a:prstGeom prst="line">
             <a:avLst/>
           </a:prstGeom>
-          <a:ln w="1">
+          <a:ln w="12700">
             <a:solidFill>
               <a:srgbClr val="0000FF"/>
             </a:solidFill>
@@ -9284,7 +9284,7 @@
           <a:prstGeom prst="line">
             <a:avLst/>
           </a:prstGeom>
-          <a:ln w="1">
+          <a:ln w="12700">
             <a:solidFill>
               <a:srgbClr val="0000FF"/>
             </a:solidFill>
@@ -9319,7 +9319,7 @@
           <a:prstGeom prst="line">
             <a:avLst/>
           </a:prstGeom>
-          <a:ln w="1">
+          <a:ln w="12700">
             <a:solidFill>
               <a:srgbClr val="0000FF"/>
             </a:solidFill>
@@ -9354,7 +9354,7 @@
           <a:prstGeom prst="line">
             <a:avLst/>
           </a:prstGeom>
-          <a:ln w="1">
+          <a:ln w="12700">
             <a:solidFill>
               <a:srgbClr val="0000FF"/>
             </a:solidFill>
@@ -9389,7 +9389,7 @@
           <a:prstGeom prst="line">
             <a:avLst/>
           </a:prstGeom>
-          <a:ln w="1">
+          <a:ln w="12700">
             <a:solidFill>
               <a:srgbClr val="0000FF"/>
             </a:solidFill>
@@ -9425,7 +9425,7 @@
           <a:prstGeom prst="line">
             <a:avLst/>
           </a:prstGeom>
-          <a:ln w="1">
+          <a:ln w="12700">
             <a:solidFill>
               <a:srgbClr val="0000FF"/>
             </a:solidFill>
@@ -9460,7 +9460,7 @@
           <a:prstGeom prst="line">
             <a:avLst/>
           </a:prstGeom>
-          <a:ln w="1">
+          <a:ln w="12700">
             <a:solidFill>
               <a:srgbClr val="0000FF"/>
             </a:solidFill>
@@ -9496,7 +9496,7 @@
           <a:prstGeom prst="line">
             <a:avLst/>
           </a:prstGeom>
-          <a:ln w="1">
+          <a:ln w="12700">
             <a:solidFill>
               <a:srgbClr val="0000FF"/>
             </a:solidFill>
@@ -9531,7 +9531,7 @@
           <a:prstGeom prst="line">
             <a:avLst/>
           </a:prstGeom>
-          <a:ln w="1">
+          <a:ln w="12700">
             <a:solidFill>
               <a:srgbClr val="0000FF"/>
             </a:solidFill>
@@ -9566,7 +9566,7 @@
           <a:prstGeom prst="line">
             <a:avLst/>
           </a:prstGeom>
-          <a:ln w="1">
+          <a:ln w="12700">
             <a:solidFill>
               <a:srgbClr val="0000FF"/>
             </a:solidFill>
@@ -9601,7 +9601,7 @@
           <a:prstGeom prst="line">
             <a:avLst/>
           </a:prstGeom>
-          <a:ln w="1">
+          <a:ln w="12700">
             <a:solidFill>
               <a:srgbClr val="0000FF"/>
             </a:solidFill>
@@ -9636,7 +9636,7 @@
           <a:prstGeom prst="line">
             <a:avLst/>
           </a:prstGeom>
-          <a:ln w="1">
+          <a:ln w="12700">
             <a:solidFill>
               <a:srgbClr val="0000FF"/>
             </a:solidFill>
@@ -9737,7 +9737,7 @@
           <a:prstGeom prst="line">
             <a:avLst/>
           </a:prstGeom>
-          <a:ln w="1">
+          <a:ln w="12700">
             <a:solidFill>
               <a:srgbClr val="0000FF"/>
             </a:solidFill>
@@ -9772,7 +9772,7 @@
           <a:prstGeom prst="line">
             <a:avLst/>
           </a:prstGeom>
-          <a:ln w="1">
+          <a:ln w="12700">
             <a:solidFill>
               <a:srgbClr val="0000FF"/>
             </a:solidFill>
@@ -9808,7 +9808,7 @@
           <a:prstGeom prst="line">
             <a:avLst/>
           </a:prstGeom>
-          <a:ln w="1">
+          <a:ln w="12700">
             <a:solidFill>
               <a:srgbClr val="0000FF"/>
             </a:solidFill>
@@ -9843,7 +9843,7 @@
           <a:prstGeom prst="line">
             <a:avLst/>
           </a:prstGeom>
-          <a:ln w="1">
+          <a:ln w="12700">
             <a:solidFill>
               <a:srgbClr val="0000FF"/>
             </a:solidFill>
@@ -9878,7 +9878,7 @@
           <a:prstGeom prst="line">
             <a:avLst/>
           </a:prstGeom>
-          <a:ln w="1">
+          <a:ln w="12700">
             <a:solidFill>
               <a:srgbClr val="0000FF"/>
             </a:solidFill>
@@ -9913,7 +9913,7 @@
           <a:prstGeom prst="line">
             <a:avLst/>
           </a:prstGeom>
-          <a:ln w="1">
+          <a:ln w="12700">
             <a:solidFill>
               <a:srgbClr val="0000FF"/>
             </a:solidFill>
@@ -9948,7 +9948,7 @@
           <a:prstGeom prst="line">
             <a:avLst/>
           </a:prstGeom>
-          <a:ln w="1">
+          <a:ln w="12700">
             <a:solidFill>
               <a:srgbClr val="0000FF"/>
             </a:solidFill>
@@ -9984,7 +9984,7 @@
           <a:prstGeom prst="line">
             <a:avLst/>
           </a:prstGeom>
-          <a:ln w="1">
+          <a:ln w="12700">
             <a:solidFill>
               <a:srgbClr val="0000FF"/>
             </a:solidFill>
@@ -10019,7 +10019,7 @@
           <a:prstGeom prst="line">
             <a:avLst/>
           </a:prstGeom>
-          <a:ln w="1">
+          <a:ln w="12700">
             <a:solidFill>
               <a:srgbClr val="0000FF"/>
             </a:solidFill>
@@ -10055,7 +10055,7 @@
           <a:prstGeom prst="line">
             <a:avLst/>
           </a:prstGeom>
-          <a:ln w="1">
+          <a:ln w="12700">
             <a:solidFill>
               <a:srgbClr val="0000FF"/>
             </a:solidFill>
@@ -10090,7 +10090,7 @@
           <a:prstGeom prst="line">
             <a:avLst/>
           </a:prstGeom>
-          <a:ln w="1">
+          <a:ln w="12700">
             <a:solidFill>
               <a:srgbClr val="0000FF"/>
             </a:solidFill>
@@ -10125,7 +10125,7 @@
           <a:prstGeom prst="line">
             <a:avLst/>
           </a:prstGeom>
-          <a:ln w="1">
+          <a:ln w="12700">
             <a:solidFill>
               <a:srgbClr val="0000FF"/>
             </a:solidFill>
@@ -10160,7 +10160,7 @@
           <a:prstGeom prst="line">
             <a:avLst/>
           </a:prstGeom>
-          <a:ln w="1">
+          <a:ln w="12700">
             <a:solidFill>
               <a:srgbClr val="0000FF"/>
             </a:solidFill>
@@ -10195,7 +10195,7 @@
           <a:prstGeom prst="line">
             <a:avLst/>
           </a:prstGeom>
-          <a:ln w="1">
+          <a:ln w="12700">
             <a:solidFill>
               <a:srgbClr val="0000FF"/>
             </a:solidFill>
@@ -10296,7 +10296,7 @@
           <a:prstGeom prst="line">
             <a:avLst/>
           </a:prstGeom>
-          <a:ln w="1">
+          <a:ln w="12700">
             <a:solidFill>
               <a:srgbClr val="0000FF"/>
             </a:solidFill>
@@ -10331,7 +10331,7 @@
           <a:prstGeom prst="line">
             <a:avLst/>
           </a:prstGeom>
-          <a:ln w="1">
+          <a:ln w="12700">
             <a:solidFill>
               <a:srgbClr val="0000FF"/>
             </a:solidFill>
@@ -10367,7 +10367,7 @@
           <a:prstGeom prst="line">
             <a:avLst/>
           </a:prstGeom>
-          <a:ln w="1">
+          <a:ln w="12700">
             <a:solidFill>
               <a:srgbClr val="0000FF"/>
             </a:solidFill>
@@ -10402,7 +10402,7 @@
           <a:prstGeom prst="line">
             <a:avLst/>
           </a:prstGeom>
-          <a:ln w="1">
+          <a:ln w="12700">
             <a:solidFill>
               <a:srgbClr val="0000FF"/>
             </a:solidFill>
@@ -10437,7 +10437,7 @@
           <a:prstGeom prst="line">
             <a:avLst/>
           </a:prstGeom>
-          <a:ln w="1">
+          <a:ln w="12700">
             <a:solidFill>
               <a:srgbClr val="0000FF"/>
             </a:solidFill>
@@ -10472,7 +10472,7 @@
           <a:prstGeom prst="line">
             <a:avLst/>
           </a:prstGeom>
-          <a:ln w="1">
+          <a:ln w="12700">
             <a:solidFill>
               <a:srgbClr val="0000FF"/>
             </a:solidFill>
@@ -10507,7 +10507,7 @@
           <a:prstGeom prst="line">
             <a:avLst/>
           </a:prstGeom>
-          <a:ln w="1">
+          <a:ln w="12700">
             <a:solidFill>
               <a:srgbClr val="0000FF"/>
             </a:solidFill>
@@ -10543,7 +10543,7 @@
           <a:prstGeom prst="line">
             <a:avLst/>
           </a:prstGeom>
-          <a:ln w="1">
+          <a:ln w="12700">
             <a:solidFill>
               <a:srgbClr val="0000FF"/>
             </a:solidFill>
@@ -10578,7 +10578,7 @@
           <a:prstGeom prst="line">
             <a:avLst/>
           </a:prstGeom>
-          <a:ln w="1">
+          <a:ln w="12700">
             <a:solidFill>
               <a:srgbClr val="0000FF"/>
             </a:solidFill>
@@ -10614,7 +10614,7 @@
           <a:prstGeom prst="line">
             <a:avLst/>
           </a:prstGeom>
-          <a:ln w="1">
+          <a:ln w="12700">
             <a:solidFill>
               <a:srgbClr val="0000FF"/>
             </a:solidFill>
@@ -10649,7 +10649,7 @@
           <a:prstGeom prst="line">
             <a:avLst/>
           </a:prstGeom>
-          <a:ln w="1">
+          <a:ln w="12700">
             <a:solidFill>
               <a:srgbClr val="0000FF"/>
             </a:solidFill>
@@ -10684,7 +10684,7 @@
           <a:prstGeom prst="line">
             <a:avLst/>
           </a:prstGeom>
-          <a:ln w="1">
+          <a:ln w="12700">
             <a:solidFill>
               <a:srgbClr val="0000FF"/>
             </a:solidFill>
@@ -10719,7 +10719,7 @@
           <a:prstGeom prst="line">
             <a:avLst/>
           </a:prstGeom>
-          <a:ln w="1">
+          <a:ln w="12700">
             <a:solidFill>
               <a:srgbClr val="0000FF"/>
             </a:solidFill>
@@ -10754,7 +10754,7 @@
           <a:prstGeom prst="line">
             <a:avLst/>
           </a:prstGeom>
-          <a:ln w="1">
+          <a:ln w="12700">
             <a:solidFill>
               <a:srgbClr val="0000FF"/>
             </a:solidFill>
@@ -10855,7 +10855,7 @@
           <a:prstGeom prst="line">
             <a:avLst/>
           </a:prstGeom>
-          <a:ln w="1">
+          <a:ln w="12700">
             <a:solidFill>
               <a:srgbClr val="0000FF"/>
             </a:solidFill>
@@ -10890,7 +10890,7 @@
           <a:prstGeom prst="line">
             <a:avLst/>
           </a:prstGeom>
-          <a:ln w="1">
+          <a:ln w="12700">
             <a:solidFill>
               <a:srgbClr val="0000FF"/>
             </a:solidFill>
@@ -10926,7 +10926,7 @@
           <a:prstGeom prst="line">
             <a:avLst/>
           </a:prstGeom>
-          <a:ln w="1">
+          <a:ln w="12700">
             <a:solidFill>
               <a:srgbClr val="0000FF"/>
             </a:solidFill>
@@ -10961,7 +10961,7 @@
           <a:prstGeom prst="line">
             <a:avLst/>
           </a:prstGeom>
-          <a:ln w="1">
+          <a:ln w="12700">
             <a:solidFill>
               <a:srgbClr val="0000FF"/>
             </a:solidFill>
@@ -10996,7 +10996,7 @@
           <a:prstGeom prst="line">
             <a:avLst/>
           </a:prstGeom>
-          <a:ln w="1">
+          <a:ln w="12700">
             <a:solidFill>
               <a:srgbClr val="0000FF"/>
             </a:solidFill>
@@ -11031,7 +11031,7 @@
           <a:prstGeom prst="line">
             <a:avLst/>
           </a:prstGeom>
-          <a:ln w="1">
+          <a:ln w="12700">
             <a:solidFill>
               <a:srgbClr val="0000FF"/>
             </a:solidFill>
@@ -11066,7 +11066,7 @@
           <a:prstGeom prst="line">
             <a:avLst/>
           </a:prstGeom>
-          <a:ln w="1">
+          <a:ln w="12700">
             <a:solidFill>
               <a:srgbClr val="0000FF"/>
             </a:solidFill>
@@ -11102,7 +11102,7 @@
           <a:prstGeom prst="line">
             <a:avLst/>
           </a:prstGeom>
-          <a:ln w="1">
+          <a:ln w="12700">
             <a:solidFill>
               <a:srgbClr val="0000FF"/>
             </a:solidFill>
@@ -11137,7 +11137,7 @@
           <a:prstGeom prst="line">
             <a:avLst/>
           </a:prstGeom>
-          <a:ln w="1">
+          <a:ln w="12700">
             <a:solidFill>
               <a:srgbClr val="0000FF"/>
             </a:solidFill>
@@ -11173,7 +11173,7 @@
           <a:prstGeom prst="line">
             <a:avLst/>
           </a:prstGeom>
-          <a:ln w="1">
+          <a:ln w="12700">
             <a:solidFill>
               <a:srgbClr val="0000FF"/>
             </a:solidFill>
@@ -11208,7 +11208,7 @@
           <a:prstGeom prst="line">
             <a:avLst/>
           </a:prstGeom>
-          <a:ln w="1">
+          <a:ln w="12700">
             <a:solidFill>
               <a:srgbClr val="0000FF"/>
             </a:solidFill>
@@ -11243,7 +11243,7 @@
           <a:prstGeom prst="line">
             <a:avLst/>
           </a:prstGeom>
-          <a:ln w="1">
+          <a:ln w="12700">
             <a:solidFill>
               <a:srgbClr val="0000FF"/>
             </a:solidFill>
@@ -11278,7 +11278,7 @@
           <a:prstGeom prst="line">
             <a:avLst/>
           </a:prstGeom>
-          <a:ln w="1">
+          <a:ln w="12700">
             <a:solidFill>
               <a:srgbClr val="0000FF"/>
             </a:solidFill>
@@ -11313,7 +11313,7 @@
           <a:prstGeom prst="line">
             <a:avLst/>
           </a:prstGeom>
-          <a:ln w="1">
+          <a:ln w="12700">
             <a:solidFill>
               <a:srgbClr val="0000FF"/>
             </a:solidFill>
@@ -11414,7 +11414,7 @@
           <a:prstGeom prst="line">
             <a:avLst/>
           </a:prstGeom>
-          <a:ln w="1">
+          <a:ln w="12700">
             <a:solidFill>
               <a:srgbClr val="0000FF"/>
             </a:solidFill>
@@ -11449,7 +11449,7 @@
           <a:prstGeom prst="line">
             <a:avLst/>
           </a:prstGeom>
-          <a:ln w="1">
+          <a:ln w="12700">
             <a:solidFill>
               <a:srgbClr val="0000FF"/>
             </a:solidFill>
@@ -11485,7 +11485,7 @@
           <a:prstGeom prst="line">
             <a:avLst/>
           </a:prstGeom>
-          <a:ln w="1">
+          <a:ln w="12700">
             <a:solidFill>
               <a:srgbClr val="0000FF"/>
             </a:solidFill>
@@ -11520,7 +11520,7 @@
           <a:prstGeom prst="line">
             <a:avLst/>
           </a:prstGeom>
-          <a:ln w="1">
+          <a:ln w="12700">
             <a:solidFill>
               <a:srgbClr val="0000FF"/>
             </a:solidFill>
@@ -11555,7 +11555,7 @@
           <a:prstGeom prst="line">
             <a:avLst/>
           </a:prstGeom>
-          <a:ln w="1">
+          <a:ln w="12700">
             <a:solidFill>
               <a:srgbClr val="0000FF"/>
             </a:solidFill>
@@ -11590,7 +11590,7 @@
           <a:prstGeom prst="line">
             <a:avLst/>
           </a:prstGeom>
-          <a:ln w="1">
+          <a:ln w="12700">
             <a:solidFill>
               <a:srgbClr val="0000FF"/>
             </a:solidFill>
@@ -11625,7 +11625,7 @@
           <a:prstGeom prst="line">
             <a:avLst/>
           </a:prstGeom>
-          <a:ln w="1">
+          <a:ln w="12700">
             <a:solidFill>
               <a:srgbClr val="0000FF"/>
             </a:solidFill>
@@ -11661,7 +11661,7 @@
           <a:prstGeom prst="line">
             <a:avLst/>
           </a:prstGeom>
-          <a:ln w="1">
+          <a:ln w="12700">
             <a:solidFill>
               <a:srgbClr val="0000FF"/>
             </a:solidFill>
@@ -11696,7 +11696,7 @@
           <a:prstGeom prst="line">
             <a:avLst/>
           </a:prstGeom>
-          <a:ln w="1">
+          <a:ln w="12700">
             <a:solidFill>
               <a:srgbClr val="0000FF"/>
             </a:solidFill>
@@ -11732,7 +11732,7 @@
           <a:prstGeom prst="line">
             <a:avLst/>
           </a:prstGeom>
-          <a:ln w="1">
+          <a:ln w="12700">
             <a:solidFill>
               <a:srgbClr val="0000FF"/>
             </a:solidFill>
@@ -11767,7 +11767,7 @@
           <a:prstGeom prst="line">
             <a:avLst/>
           </a:prstGeom>
-          <a:ln w="1">
+          <a:ln w="12700">
             <a:solidFill>
               <a:srgbClr val="0000FF"/>
             </a:solidFill>
@@ -11802,7 +11802,7 @@
           <a:prstGeom prst="line">
             <a:avLst/>
           </a:prstGeom>
-          <a:ln w="1">
+          <a:ln w="12700">
             <a:solidFill>
               <a:srgbClr val="0000FF"/>
             </a:solidFill>
@@ -11837,7 +11837,7 @@
           <a:prstGeom prst="line">
             <a:avLst/>
           </a:prstGeom>
-          <a:ln w="1">
+          <a:ln w="12700">
             <a:solidFill>
               <a:srgbClr val="0000FF"/>
             </a:solidFill>
@@ -11872,7 +11872,7 @@
           <a:prstGeom prst="line">
             <a:avLst/>
           </a:prstGeom>
-          <a:ln w="1">
+          <a:ln w="12700">
             <a:solidFill>
               <a:srgbClr val="0000FF"/>
             </a:solidFill>
@@ -11973,7 +11973,7 @@
           <a:prstGeom prst="line">
             <a:avLst/>
           </a:prstGeom>
-          <a:ln w="1">
+          <a:ln w="12700">
             <a:solidFill>
               <a:srgbClr val="0000FF"/>
             </a:solidFill>
@@ -12008,7 +12008,7 @@
           <a:prstGeom prst="line">
             <a:avLst/>
           </a:prstGeom>
-          <a:ln w="1">
+          <a:ln w="12700">
             <a:solidFill>
               <a:srgbClr val="0000FF"/>
             </a:solidFill>
@@ -12044,7 +12044,7 @@
           <a:prstGeom prst="line">
             <a:avLst/>
           </a:prstGeom>
-          <a:ln w="1">
+          <a:ln w="12700">
             <a:solidFill>
               <a:srgbClr val="0000FF"/>
             </a:solidFill>
@@ -12079,7 +12079,7 @@
           <a:prstGeom prst="line">
             <a:avLst/>
           </a:prstGeom>
-          <a:ln w="1">
+          <a:ln w="12700">
             <a:solidFill>
               <a:srgbClr val="0000FF"/>
             </a:solidFill>
@@ -12114,7 +12114,7 @@
           <a:prstGeom prst="line">
             <a:avLst/>
           </a:prstGeom>
-          <a:ln w="1">
+          <a:ln w="12700">
             <a:solidFill>
               <a:srgbClr val="0000FF"/>
             </a:solidFill>
@@ -12149,7 +12149,7 @@
           <a:prstGeom prst="line">
             <a:avLst/>
           </a:prstGeom>
-          <a:ln w="1">
+          <a:ln w="12700">
             <a:solidFill>
               <a:srgbClr val="0000FF"/>
             </a:solidFill>
@@ -12184,7 +12184,7 @@
           <a:prstGeom prst="line">
             <a:avLst/>
           </a:prstGeom>
-          <a:ln w="1">
+          <a:ln w="12700">
             <a:solidFill>
               <a:srgbClr val="0000FF"/>
             </a:solidFill>
@@ -12220,7 +12220,7 @@
           <a:prstGeom prst="line">
             <a:avLst/>
           </a:prstGeom>
-          <a:ln w="1">
+          <a:ln w="12700">
             <a:solidFill>
               <a:srgbClr val="0000FF"/>
             </a:solidFill>
@@ -12255,7 +12255,7 @@
           <a:prstGeom prst="line">
             <a:avLst/>
           </a:prstGeom>
-          <a:ln w="1">
+          <a:ln w="12700">
             <a:solidFill>
               <a:srgbClr val="0000FF"/>
             </a:solidFill>
@@ -12291,7 +12291,7 @@
           <a:prstGeom prst="line">
             <a:avLst/>
           </a:prstGeom>
-          <a:ln w="1">
+          <a:ln w="12700">
             <a:solidFill>
               <a:srgbClr val="0000FF"/>
             </a:solidFill>
@@ -12326,7 +12326,7 @@
           <a:prstGeom prst="line">
             <a:avLst/>
           </a:prstGeom>
-          <a:ln w="1">
+          <a:ln w="12700">
             <a:solidFill>
               <a:srgbClr val="0000FF"/>
             </a:solidFill>
@@ -12361,7 +12361,7 @@
           <a:prstGeom prst="line">
             <a:avLst/>
           </a:prstGeom>
-          <a:ln w="1">
+          <a:ln w="12700">
             <a:solidFill>
               <a:srgbClr val="0000FF"/>
             </a:solidFill>
@@ -12396,7 +12396,7 @@
           <a:prstGeom prst="line">
             <a:avLst/>
           </a:prstGeom>
-          <a:ln w="1">
+          <a:ln w="12700">
             <a:solidFill>
               <a:srgbClr val="0000FF"/>
             </a:solidFill>
@@ -12431,7 +12431,7 @@
           <a:prstGeom prst="line">
             <a:avLst/>
           </a:prstGeom>
-          <a:ln w="1">
+          <a:ln w="12700">
             <a:solidFill>
               <a:srgbClr val="0000FF"/>
             </a:solidFill>
@@ -12598,7 +12598,7 @@
           <a:prstGeom prst="line">
             <a:avLst/>
           </a:prstGeom>
-          <a:ln w="1">
+          <a:ln w="12700">
             <a:solidFill>
               <a:srgbClr val="0000FF"/>
             </a:solidFill>
@@ -12634,7 +12634,7 @@
           <a:prstGeom prst="line">
             <a:avLst/>
           </a:prstGeom>
-          <a:ln w="1">
+          <a:ln w="12700">
             <a:solidFill>
               <a:srgbClr val="0000FF"/>
             </a:solidFill>
@@ -12703,7 +12703,7 @@
           <a:prstGeom prst="line">
             <a:avLst/>
           </a:prstGeom>
-          <a:ln w="1">
+          <a:ln w="12700">
             <a:solidFill>
               <a:srgbClr val="0000FF"/>
             </a:solidFill>
@@ -12739,7 +12739,7 @@
           <a:prstGeom prst="line">
             <a:avLst/>
           </a:prstGeom>
-          <a:ln w="1">
+          <a:ln w="12700">
             <a:solidFill>
               <a:srgbClr val="0000FF"/>
             </a:solidFill>
@@ -12808,7 +12808,7 @@
           <a:prstGeom prst="line">
             <a:avLst/>
           </a:prstGeom>
-          <a:ln w="1">
+          <a:ln w="12700">
             <a:solidFill>
               <a:srgbClr val="0000FF"/>
             </a:solidFill>
@@ -12844,7 +12844,7 @@
           <a:prstGeom prst="line">
             <a:avLst/>
           </a:prstGeom>
-          <a:ln w="1">
+          <a:ln w="12700">
             <a:solidFill>
               <a:srgbClr val="0000FF"/>
             </a:solidFill>
@@ -12913,7 +12913,7 @@
           <a:prstGeom prst="line">
             <a:avLst/>
           </a:prstGeom>
-          <a:ln w="1">
+          <a:ln w="12700">
             <a:solidFill>
               <a:srgbClr val="0000FF"/>
             </a:solidFill>
@@ -12949,7 +12949,7 @@
           <a:prstGeom prst="line">
             <a:avLst/>
           </a:prstGeom>
-          <a:ln w="1">
+          <a:ln w="12700">
             <a:solidFill>
               <a:srgbClr val="0000FF"/>
             </a:solidFill>
@@ -13018,7 +13018,7 @@
           <a:prstGeom prst="line">
             <a:avLst/>
           </a:prstGeom>
-          <a:ln w="1">
+          <a:ln w="12700">
             <a:solidFill>
               <a:srgbClr val="0000FF"/>
             </a:solidFill>
@@ -13054,7 +13054,7 @@
           <a:prstGeom prst="line">
             <a:avLst/>
           </a:prstGeom>
-          <a:ln w="1">
+          <a:ln w="12700">
             <a:solidFill>
               <a:srgbClr val="0000FF"/>
             </a:solidFill>
@@ -13123,7 +13123,7 @@
           <a:prstGeom prst="line">
             <a:avLst/>
           </a:prstGeom>
-          <a:ln w="1">
+          <a:ln w="12700">
             <a:solidFill>
               <a:srgbClr val="0000FF"/>
             </a:solidFill>
@@ -13159,7 +13159,7 @@
           <a:prstGeom prst="line">
             <a:avLst/>
           </a:prstGeom>
-          <a:ln w="1">
+          <a:ln w="12700">
             <a:solidFill>
               <a:srgbClr val="0000FF"/>
             </a:solidFill>

</xml_diff>